<commit_message>
Auto stash before merge of "syq_branch" and "master"
</commit_message>
<xml_diff>
--- a/doc/软件规格说明ppt.pptx
+++ b/doc/软件规格说明ppt.pptx
@@ -237,7 +237,7 @@
           <a:p>
             <a:fld id="{3E6E1E63-6347-BD4F-A808-7F54FA34CE72}" type="datetimeFigureOut">
               <a:rPr kumimoji="1" lang="zh-CN" altLang="en-US" smtClean="0"/>
-              <a:t>2017/11/14</a:t>
+              <a:t>2017/11/15</a:t>
             </a:fld>
             <a:endParaRPr kumimoji="1" lang="zh-CN" altLang="en-US"/>
           </a:p>
@@ -17087,31 +17087,7 @@
                 <a:ea typeface="DengXian Light" charset="-122"/>
                 <a:cs typeface="Times New Roman" charset="0"/>
               </a:rPr>
-              <a:t>详见</a:t>
-            </a:r>
-            <a:r>
-              <a:rPr lang="zh-CN" altLang="en-US" b="1" kern="100" dirty="0" smtClean="0">
-                <a:latin typeface="DengXian Light" charset="-122"/>
-                <a:ea typeface="DengXian Light" charset="-122"/>
-                <a:cs typeface="Times New Roman" charset="0"/>
-              </a:rPr>
-              <a:t>附件</a:t>
-            </a:r>
-            <a:r>
-              <a:rPr lang="zh-CN" altLang="en-US" b="1" kern="100" dirty="0" smtClean="0">
-                <a:latin typeface="DengXian Light" charset="-122"/>
-                <a:ea typeface="DengXian Light" charset="-122"/>
-                <a:cs typeface="Times New Roman" charset="0"/>
-              </a:rPr>
-              <a:t>状态</a:t>
-            </a:r>
-            <a:r>
-              <a:rPr lang="zh-CN" altLang="en-US" b="1" kern="100" dirty="0" smtClean="0">
-                <a:latin typeface="DengXian Light" charset="-122"/>
-                <a:ea typeface="DengXian Light" charset="-122"/>
-                <a:cs typeface="Times New Roman" charset="0"/>
-              </a:rPr>
-              <a:t>图</a:t>
+              <a:t>详见附件状态图</a:t>
             </a:r>
             <a:endParaRPr lang="zh-CN" altLang="zh-CN" b="1" kern="100" dirty="0">
               <a:effectLst/>
@@ -23843,7 +23819,7 @@
         <p:spPr>
           <a:xfrm>
             <a:off x="4848403" y="3515351"/>
-            <a:ext cx="5513832" cy="1754326"/>
+            <a:ext cx="5513832" cy="1477328"/>
           </a:xfrm>
           <a:prstGeom prst="rect">
             <a:avLst/>
@@ -23870,11 +23846,7 @@
             </a:r>
             <a:r>
               <a:rPr lang="zh-CN" altLang="en-US" dirty="0" smtClean="0"/>
-              <a:t>文档编写，数据字典制作，</a:t>
-            </a:r>
-            <a:r>
-              <a:rPr lang="en-US" altLang="zh-CN" dirty="0" err="1" smtClean="0"/>
-              <a:t>appdemo</a:t>
+              <a:t>文档编写，数据字典</a:t>
             </a:r>
             <a:r>
               <a:rPr lang="zh-CN" altLang="en-US" dirty="0" smtClean="0"/>
@@ -23882,7 +23854,11 @@
             </a:r>
             <a:r>
               <a:rPr lang="en-US" altLang="zh-CN" dirty="0" smtClean="0"/>
-              <a:t>——5</a:t>
+              <a:t>——</a:t>
+            </a:r>
+            <a:r>
+              <a:rPr lang="en-US" altLang="zh-CN" dirty="0" smtClean="0"/>
+              <a:t>5</a:t>
             </a:r>
             <a:r>
               <a:rPr lang="zh-CN" altLang="en-US" dirty="0" smtClean="0"/>
@@ -23907,11 +23883,11 @@
               <a:t>文档编写，原型制作</a:t>
             </a:r>
             <a:r>
-              <a:rPr lang="en-US" altLang="zh-CN" dirty="0" smtClean="0"/>
-              <a:t>——5</a:t>
-            </a:r>
-            <a:r>
-              <a:rPr lang="zh-CN" altLang="en-US" dirty="0" smtClean="0"/>
+              <a:rPr lang="en-US" altLang="zh-CN" smtClean="0"/>
+              <a:t>——3</a:t>
+            </a:r>
+            <a:r>
+              <a:rPr lang="zh-CN" altLang="en-US" smtClean="0"/>
               <a:t>分</a:t>
             </a:r>
             <a:endParaRPr lang="en-US" altLang="zh-CN" dirty="0" smtClean="0"/>

</xml_diff>